<commit_message>
Update website with new content and images
</commit_message>
<xml_diff>
--- a/Presentation1.pptx
+++ b/Presentation1.pptx
@@ -118,6 +118,11 @@
       </a:defRPr>
     </a:lvl9pPr>
   </p:defaultTextStyle>
+  <p:extLst>
+    <p:ext uri="{EFAFB233-063F-42B5-8137-9DF3F51BA10A}">
+      <p15:sldGuideLst xmlns:p15="http://schemas.microsoft.com/office/powerpoint/2012/main"/>
+    </p:ext>
+  </p:extLst>
 </p:presentation>
 </file>
 
@@ -203,7 +208,7 @@
           <a:p>
             <a:fld id="{7ADDD787-14F7-134A-8703-5C7929AF9B60}" type="datetimeFigureOut">
               <a:rPr lang="en-US" smtClean="0"/>
-              <a:t>2/2/25</a:t>
+              <a:t>2/16/25</a:t>
             </a:fld>
             <a:endParaRPr lang="en-US"/>
           </a:p>
@@ -1707,7 +1712,7 @@
           <a:p>
             <a:fld id="{5BF55880-368F-3B42-809F-E07DD75CE783}" type="datetimeFigureOut">
               <a:rPr lang="en-US" smtClean="0"/>
-              <a:t>2/2/25</a:t>
+              <a:t>2/16/25</a:t>
             </a:fld>
             <a:endParaRPr lang="en-US"/>
           </a:p>
@@ -1877,7 +1882,7 @@
           <a:p>
             <a:fld id="{5BF55880-368F-3B42-809F-E07DD75CE783}" type="datetimeFigureOut">
               <a:rPr lang="en-US" smtClean="0"/>
-              <a:t>2/2/25</a:t>
+              <a:t>2/16/25</a:t>
             </a:fld>
             <a:endParaRPr lang="en-US"/>
           </a:p>
@@ -2057,7 +2062,7 @@
           <a:p>
             <a:fld id="{5BF55880-368F-3B42-809F-E07DD75CE783}" type="datetimeFigureOut">
               <a:rPr lang="en-US" smtClean="0"/>
-              <a:t>2/2/25</a:t>
+              <a:t>2/16/25</a:t>
             </a:fld>
             <a:endParaRPr lang="en-US"/>
           </a:p>
@@ -2227,7 +2232,7 @@
           <a:p>
             <a:fld id="{5BF55880-368F-3B42-809F-E07DD75CE783}" type="datetimeFigureOut">
               <a:rPr lang="en-US" smtClean="0"/>
-              <a:t>2/2/25</a:t>
+              <a:t>2/16/25</a:t>
             </a:fld>
             <a:endParaRPr lang="en-US"/>
           </a:p>
@@ -2473,7 +2478,7 @@
           <a:p>
             <a:fld id="{5BF55880-368F-3B42-809F-E07DD75CE783}" type="datetimeFigureOut">
               <a:rPr lang="en-US" smtClean="0"/>
-              <a:t>2/2/25</a:t>
+              <a:t>2/16/25</a:t>
             </a:fld>
             <a:endParaRPr lang="en-US"/>
           </a:p>
@@ -2705,7 +2710,7 @@
           <a:p>
             <a:fld id="{5BF55880-368F-3B42-809F-E07DD75CE783}" type="datetimeFigureOut">
               <a:rPr lang="en-US" smtClean="0"/>
-              <a:t>2/2/25</a:t>
+              <a:t>2/16/25</a:t>
             </a:fld>
             <a:endParaRPr lang="en-US"/>
           </a:p>
@@ -3072,7 +3077,7 @@
           <a:p>
             <a:fld id="{5BF55880-368F-3B42-809F-E07DD75CE783}" type="datetimeFigureOut">
               <a:rPr lang="en-US" smtClean="0"/>
-              <a:t>2/2/25</a:t>
+              <a:t>2/16/25</a:t>
             </a:fld>
             <a:endParaRPr lang="en-US"/>
           </a:p>
@@ -3190,7 +3195,7 @@
           <a:p>
             <a:fld id="{5BF55880-368F-3B42-809F-E07DD75CE783}" type="datetimeFigureOut">
               <a:rPr lang="en-US" smtClean="0"/>
-              <a:t>2/2/25</a:t>
+              <a:t>2/16/25</a:t>
             </a:fld>
             <a:endParaRPr lang="en-US"/>
           </a:p>
@@ -3285,7 +3290,7 @@
           <a:p>
             <a:fld id="{5BF55880-368F-3B42-809F-E07DD75CE783}" type="datetimeFigureOut">
               <a:rPr lang="en-US" smtClean="0"/>
-              <a:t>2/2/25</a:t>
+              <a:t>2/16/25</a:t>
             </a:fld>
             <a:endParaRPr lang="en-US"/>
           </a:p>
@@ -3562,7 +3567,7 @@
           <a:p>
             <a:fld id="{5BF55880-368F-3B42-809F-E07DD75CE783}" type="datetimeFigureOut">
               <a:rPr lang="en-US" smtClean="0"/>
-              <a:t>2/2/25</a:t>
+              <a:t>2/16/25</a:t>
             </a:fld>
             <a:endParaRPr lang="en-US"/>
           </a:p>
@@ -3819,7 +3824,7 @@
           <a:p>
             <a:fld id="{5BF55880-368F-3B42-809F-E07DD75CE783}" type="datetimeFigureOut">
               <a:rPr lang="en-US" smtClean="0"/>
-              <a:t>2/2/25</a:t>
+              <a:t>2/16/25</a:t>
             </a:fld>
             <a:endParaRPr lang="en-US"/>
           </a:p>
@@ -4032,7 +4037,7 @@
           <a:p>
             <a:fld id="{5BF55880-368F-3B42-809F-E07DD75CE783}" type="datetimeFigureOut">
               <a:rPr lang="en-US" smtClean="0"/>
-              <a:t>2/2/25</a:t>
+              <a:t>2/16/25</a:t>
             </a:fld>
             <a:endParaRPr lang="en-US"/>
           </a:p>
@@ -5143,6 +5148,52 @@
               <a:schemeClr val="tx1"/>
             </a:solidFill>
           </a:ln>
+        </p:spPr>
+        <p:style>
+          <a:lnRef idx="2">
+            <a:schemeClr val="accent1">
+              <a:shade val="15000"/>
+            </a:schemeClr>
+          </a:lnRef>
+          <a:fillRef idx="1">
+            <a:schemeClr val="accent1"/>
+          </a:fillRef>
+          <a:effectRef idx="0">
+            <a:schemeClr val="accent1"/>
+          </a:effectRef>
+          <a:fontRef idx="minor">
+            <a:schemeClr val="lt1"/>
+          </a:fontRef>
+        </p:style>
+        <p:txBody>
+          <a:bodyPr rtlCol="0" anchor="ctr"/>
+          <a:lstStyle/>
+          <a:p>
+            <a:pPr algn="ctr"/>
+            <a:endParaRPr lang="en-US"/>
+          </a:p>
+        </p:txBody>
+      </p:sp>
+      <p:sp>
+        <p:nvSpPr>
+          <p:cNvPr id="4" name="Rounded Rectangle 3">
+            <a:extLst>
+              <a:ext uri="{FF2B5EF4-FFF2-40B4-BE49-F238E27FC236}">
+                <a16:creationId xmlns:a16="http://schemas.microsoft.com/office/drawing/2014/main" id="{F5502A7D-020A-27C7-D9C3-0A7AA70C9DD0}"/>
+              </a:ext>
+            </a:extLst>
+          </p:cNvPr>
+          <p:cNvSpPr/>
+          <p:nvPr/>
+        </p:nvSpPr>
+        <p:spPr>
+          <a:xfrm>
+            <a:off x="6071012" y="3677580"/>
+            <a:ext cx="2372139" cy="3233531"/>
+          </a:xfrm>
+          <a:prstGeom prst="roundRect">
+            <a:avLst/>
+          </a:prstGeom>
         </p:spPr>
         <p:style>
           <a:lnRef idx="2">

</xml_diff>